<commit_message>
+ Add some problems
</commit_message>
<xml_diff>
--- a/cs-seminar/算法与数据结构/树.pptx
+++ b/cs-seminar/算法与数据结构/树.pptx
@@ -263,7 +263,7 @@
           <a:p>
             <a:fld id="{9C395F08-296D-4F57-99DE-4DE9612FD2E8}" type="datetimeFigureOut">
               <a:rPr lang="zh-CN" altLang="en-US" smtClean="0"/>
-              <a:t>2020/6/27</a:t>
+              <a:t>2021/3/6</a:t>
             </a:fld>
             <a:endParaRPr lang="zh-CN" altLang="en-US"/>
           </a:p>
@@ -748,7 +748,7 @@
           <a:p>
             <a:fld id="{70DE98D0-9A98-4B82-9573-1B9E451B3DD8}" type="datetime1">
               <a:rPr lang="zh-CN" altLang="en-US" smtClean="0"/>
-              <a:t>2020/6/27</a:t>
+              <a:t>2021/3/6</a:t>
             </a:fld>
             <a:endParaRPr lang="zh-CN" altLang="en-US"/>
           </a:p>
@@ -920,7 +920,7 @@
           <a:p>
             <a:fld id="{CAD6EDDE-8258-4135-98D1-138C89A7D11F}" type="datetime1">
               <a:rPr lang="zh-CN" altLang="en-US" smtClean="0"/>
-              <a:t>2020/6/27</a:t>
+              <a:t>2021/3/6</a:t>
             </a:fld>
             <a:endParaRPr lang="zh-CN" altLang="en-US"/>
           </a:p>
@@ -1102,7 +1102,7 @@
           <a:p>
             <a:fld id="{A4F786FF-FC21-41E5-B843-4724DBB978DB}" type="datetime1">
               <a:rPr lang="zh-CN" altLang="en-US" smtClean="0"/>
-              <a:t>2020/6/27</a:t>
+              <a:t>2021/3/6</a:t>
             </a:fld>
             <a:endParaRPr lang="zh-CN" altLang="en-US"/>
           </a:p>
@@ -1581,7 +1581,7 @@
           <a:p>
             <a:fld id="{6A3DF257-FFF4-43D3-A734-023879B918D0}" type="datetime1">
               <a:rPr lang="zh-CN" altLang="en-US" smtClean="0"/>
-              <a:t>2020/6/27</a:t>
+              <a:t>2021/3/6</a:t>
             </a:fld>
             <a:endParaRPr lang="zh-CN" altLang="en-US"/>
           </a:p>
@@ -1814,7 +1814,7 @@
           <a:p>
             <a:fld id="{558E8501-F9B5-4D99-BE36-F931E4F74C2A}" type="datetime1">
               <a:rPr lang="zh-CN" altLang="en-US" smtClean="0"/>
-              <a:t>2020/6/27</a:t>
+              <a:t>2021/3/6</a:t>
             </a:fld>
             <a:endParaRPr lang="zh-CN" altLang="en-US"/>
           </a:p>
@@ -2182,7 +2182,7 @@
           <a:p>
             <a:fld id="{290F56E6-87CB-4499-B353-DB44E8B6FDF1}" type="datetime1">
               <a:rPr lang="zh-CN" altLang="en-US" smtClean="0"/>
-              <a:t>2020/6/27</a:t>
+              <a:t>2021/3/6</a:t>
             </a:fld>
             <a:endParaRPr lang="zh-CN" altLang="en-US"/>
           </a:p>
@@ -2303,7 +2303,7 @@
           <a:p>
             <a:fld id="{3ADCBD56-D48A-4982-A9C5-6E7E68182A52}" type="datetime1">
               <a:rPr lang="zh-CN" altLang="en-US" smtClean="0"/>
-              <a:t>2020/6/27</a:t>
+              <a:t>2021/3/6</a:t>
             </a:fld>
             <a:endParaRPr lang="zh-CN" altLang="en-US"/>
           </a:p>
@@ -2402,7 +2402,7 @@
           <a:p>
             <a:fld id="{BE83D10E-741F-4194-B7A0-87FEF338E493}" type="datetime1">
               <a:rPr lang="zh-CN" altLang="en-US" smtClean="0"/>
-              <a:t>2020/6/27</a:t>
+              <a:t>2021/3/6</a:t>
             </a:fld>
             <a:endParaRPr lang="zh-CN" altLang="en-US"/>
           </a:p>
@@ -2681,7 +2681,7 @@
           <a:p>
             <a:fld id="{3BDB64AC-4CDF-4D37-8EE1-BC1891535049}" type="datetime1">
               <a:rPr lang="zh-CN" altLang="en-US" smtClean="0"/>
-              <a:t>2020/6/27</a:t>
+              <a:t>2021/3/6</a:t>
             </a:fld>
             <a:endParaRPr lang="zh-CN" altLang="en-US"/>
           </a:p>
@@ -2937,7 +2937,7 @@
           <a:p>
             <a:fld id="{A57B5AE3-5035-4FBD-9579-809DCC9BC55E}" type="datetime1">
               <a:rPr lang="zh-CN" altLang="en-US" smtClean="0"/>
-              <a:t>2020/6/27</a:t>
+              <a:t>2021/3/6</a:t>
             </a:fld>
             <a:endParaRPr lang="zh-CN" altLang="en-US"/>
           </a:p>
@@ -3152,7 +3152,7 @@
           <a:p>
             <a:fld id="{9FF488AB-DBA9-432E-8968-8C1072E4CA37}" type="datetime1">
               <a:rPr lang="zh-CN" altLang="en-US" smtClean="0"/>
-              <a:t>2020/6/27</a:t>
+              <a:t>2021/3/6</a:t>
             </a:fld>
             <a:endParaRPr lang="zh-CN" altLang="en-US"/>
           </a:p>

</xml_diff>